<commit_message>
Some minor updates after telecon on 23/1: - renamed Case Data to Business Context - renamed Core Components into Compliance Components (categories still TBD) - migrated remaining descriptions into Capabilities Glossary
</commit_message>
<xml_diff>
--- a/Tooling-Landscape/Unanimous-Understanding/OC-Reference-Tooling-Capabilities.pptx
+++ b/Tooling-Landscape/Unanimous-Understanding/OC-Reference-Tooling-Capabilities.pptx
@@ -1114,7 +1114,7 @@
           </a:ln>
           <a:extLst>
             <a:ext uri="{C572A759-6A51-4108-AA02-DFA0A04FC94B}">
-              <ma14:wrappingTextBoxFlag xmlns:ma14="http://schemas.microsoft.com/office/mac/drawingml/2011/main" xmlns:a14="http://schemas.microsoft.com/office/drawing/2010/main" xmlns:m="http://schemas.openxmlformats.org/officeDocument/2006/math" xmlns="" val="1"/>
+              <ma14:wrappingTextBoxFlag xmlns="" xmlns:m="http://schemas.openxmlformats.org/officeDocument/2006/math" xmlns:a14="http://schemas.microsoft.com/office/drawing/2010/main" xmlns:ma14="http://schemas.microsoft.com/office/mac/drawingml/2011/main" val="1"/>
             </a:ext>
           </a:extLst>
         </p:spPr>
@@ -1354,7 +1354,7 @@
           </a:ln>
           <a:extLst>
             <a:ext uri="{C572A759-6A51-4108-AA02-DFA0A04FC94B}">
-              <ma14:wrappingTextBoxFlag xmlns:ma14="http://schemas.microsoft.com/office/mac/drawingml/2011/main" xmlns:a14="http://schemas.microsoft.com/office/drawing/2010/main" xmlns:m="http://schemas.openxmlformats.org/officeDocument/2006/math" xmlns="" val="1"/>
+              <ma14:wrappingTextBoxFlag xmlns="" xmlns:m="http://schemas.openxmlformats.org/officeDocument/2006/math" xmlns:a14="http://schemas.microsoft.com/office/drawing/2010/main" xmlns:ma14="http://schemas.microsoft.com/office/mac/drawingml/2011/main" val="1"/>
             </a:ext>
           </a:extLst>
         </p:spPr>
@@ -1401,7 +1401,7 @@
           </a:ln>
           <a:extLst>
             <a:ext uri="{C572A759-6A51-4108-AA02-DFA0A04FC94B}">
-              <ma14:wrappingTextBoxFlag xmlns:ma14="http://schemas.microsoft.com/office/mac/drawingml/2011/main" xmlns:a14="http://schemas.microsoft.com/office/drawing/2010/main" xmlns:m="http://schemas.openxmlformats.org/officeDocument/2006/math" xmlns="" val="1"/>
+              <ma14:wrappingTextBoxFlag xmlns="" xmlns:m="http://schemas.openxmlformats.org/officeDocument/2006/math" xmlns:a14="http://schemas.microsoft.com/office/drawing/2010/main" xmlns:ma14="http://schemas.microsoft.com/office/mac/drawingml/2011/main" val="1"/>
             </a:ext>
           </a:extLst>
         </p:spPr>
@@ -1622,7 +1622,7 @@
           </a:ln>
           <a:extLst>
             <a:ext uri="{C572A759-6A51-4108-AA02-DFA0A04FC94B}">
-              <ma14:wrappingTextBoxFlag xmlns:ma14="http://schemas.microsoft.com/office/mac/drawingml/2011/main" xmlns:a14="http://schemas.microsoft.com/office/drawing/2010/main" xmlns:m="http://schemas.openxmlformats.org/officeDocument/2006/math" xmlns="" val="1"/>
+              <ma14:wrappingTextBoxFlag xmlns="" xmlns:m="http://schemas.openxmlformats.org/officeDocument/2006/math" xmlns:a14="http://schemas.microsoft.com/office/drawing/2010/main" xmlns:ma14="http://schemas.microsoft.com/office/mac/drawingml/2011/main" val="1"/>
             </a:ext>
           </a:extLst>
         </p:spPr>
@@ -1664,7 +1664,7 @@
           </a:ln>
           <a:extLst>
             <a:ext uri="{C572A759-6A51-4108-AA02-DFA0A04FC94B}">
-              <ma14:wrappingTextBoxFlag xmlns:ma14="http://schemas.microsoft.com/office/mac/drawingml/2011/main" xmlns:a14="http://schemas.microsoft.com/office/drawing/2010/main" xmlns:m="http://schemas.openxmlformats.org/officeDocument/2006/math" xmlns="" val="1"/>
+              <ma14:wrappingTextBoxFlag xmlns="" xmlns:m="http://schemas.openxmlformats.org/officeDocument/2006/math" xmlns:a14="http://schemas.microsoft.com/office/drawing/2010/main" xmlns:ma14="http://schemas.microsoft.com/office/mac/drawingml/2011/main" val="1"/>
             </a:ext>
           </a:extLst>
         </p:spPr>
@@ -1755,7 +1755,7 @@
           </a:ln>
           <a:extLst>
             <a:ext uri="{C572A759-6A51-4108-AA02-DFA0A04FC94B}">
-              <ma14:wrappingTextBoxFlag xmlns:ma14="http://schemas.microsoft.com/office/mac/drawingml/2011/main" xmlns:a14="http://schemas.microsoft.com/office/drawing/2010/main" xmlns:m="http://schemas.openxmlformats.org/officeDocument/2006/math" xmlns="" val="1"/>
+              <ma14:wrappingTextBoxFlag xmlns="" xmlns:m="http://schemas.openxmlformats.org/officeDocument/2006/math" xmlns:a14="http://schemas.microsoft.com/office/drawing/2010/main" xmlns:ma14="http://schemas.microsoft.com/office/mac/drawingml/2011/main" val="1"/>
             </a:ext>
           </a:extLst>
         </p:spPr>
@@ -1802,7 +1802,7 @@
           </a:ln>
           <a:extLst>
             <a:ext uri="{C572A759-6A51-4108-AA02-DFA0A04FC94B}">
-              <ma14:wrappingTextBoxFlag xmlns:ma14="http://schemas.microsoft.com/office/mac/drawingml/2011/main" xmlns:a14="http://schemas.microsoft.com/office/drawing/2010/main" xmlns:m="http://schemas.openxmlformats.org/officeDocument/2006/math" xmlns="" val="1"/>
+              <ma14:wrappingTextBoxFlag xmlns="" xmlns:m="http://schemas.openxmlformats.org/officeDocument/2006/math" xmlns:a14="http://schemas.microsoft.com/office/drawing/2010/main" xmlns:ma14="http://schemas.microsoft.com/office/mac/drawingml/2011/main" val="1"/>
             </a:ext>
           </a:extLst>
         </p:spPr>
@@ -2690,7 +2690,7 @@
           </a:ln>
           <a:extLst>
             <a:ext uri="{C572A759-6A51-4108-AA02-DFA0A04FC94B}">
-              <ma14:wrappingTextBoxFlag xmlns:ma14="http://schemas.microsoft.com/office/mac/drawingml/2011/main" xmlns:a14="http://schemas.microsoft.com/office/drawing/2010/main" xmlns:m="http://schemas.openxmlformats.org/officeDocument/2006/math" xmlns="" val="1"/>
+              <ma14:wrappingTextBoxFlag xmlns="" xmlns:m="http://schemas.openxmlformats.org/officeDocument/2006/math" xmlns:a14="http://schemas.microsoft.com/office/drawing/2010/main" xmlns:ma14="http://schemas.microsoft.com/office/mac/drawingml/2011/main" val="1"/>
             </a:ext>
           </a:extLst>
         </p:spPr>
@@ -2776,7 +2776,7 @@
           </a:prstGeom>
           <a:extLst>
             <a:ext uri="{C572A759-6A51-4108-AA02-DFA0A04FC94B}">
-              <ma14:wrappingTextBoxFlag xmlns:ma14="http://schemas.microsoft.com/office/mac/drawingml/2011/main" xmlns:a14="http://schemas.microsoft.com/office/drawing/2010/main" xmlns:m="http://schemas.openxmlformats.org/officeDocument/2006/math" xmlns="" val="1"/>
+              <ma14:wrappingTextBoxFlag xmlns="" xmlns:m="http://schemas.openxmlformats.org/officeDocument/2006/math" xmlns:a14="http://schemas.microsoft.com/office/drawing/2010/main" xmlns:ma14="http://schemas.microsoft.com/office/mac/drawingml/2011/main" val="1"/>
             </a:ext>
           </a:extLst>
         </p:spPr>
@@ -3359,9 +3359,6 @@
                         </a:rPr>
                         <a:t>Draft alignment with Component Model, </a:t>
                       </a:r>
-                      <a:endParaRPr lang="de-DE" sz="1200" b="0" i="0" dirty="0" smtClean="0">
-                        <a:latin typeface="+mn-lt"/>
-                      </a:endParaRPr>
                     </a:p>
                     <a:p>
                       <a:pPr marL="171450" indent="-171450" algn="l">
@@ -3372,19 +3369,7 @@
                         <a:rPr lang="de-DE" sz="1200" b="0" i="0" dirty="0" smtClean="0">
                           <a:latin typeface="+mn-lt"/>
                         </a:rPr>
-                        <a:t>Moved all descriptive </a:t>
-                      </a:r>
-                      <a:r>
-                        <a:rPr lang="de-DE" sz="1200" b="0" i="0" dirty="0" smtClean="0">
-                          <a:latin typeface="+mn-lt"/>
-                        </a:rPr>
-                        <a:t>text into separate MD </a:t>
-                      </a:r>
-                      <a:r>
-                        <a:rPr lang="de-DE" sz="1200" b="0" i="0" dirty="0" smtClean="0">
-                          <a:latin typeface="+mn-lt"/>
-                        </a:rPr>
-                        <a:t>file</a:t>
+                        <a:t>Moved all descriptive text into separate MD file</a:t>
                       </a:r>
                     </a:p>
                     <a:p>
@@ -3408,19 +3393,7 @@
                         <a:rPr lang="de-DE" sz="1200" b="0" i="0" dirty="0" smtClean="0">
                           <a:latin typeface="+mn-lt"/>
                         </a:rPr>
-                        <a:t>Renamed </a:t>
-                      </a:r>
-                      <a:r>
-                        <a:rPr lang="de-DE" sz="1200" b="0" i="0" dirty="0" smtClean="0">
-                          <a:latin typeface="+mn-lt"/>
-                        </a:rPr>
-                        <a:t>Package to Component </a:t>
-                      </a:r>
-                      <a:r>
-                        <a:rPr lang="de-DE" sz="1200" b="0" i="0" dirty="0" smtClean="0">
-                          <a:latin typeface="+mn-lt"/>
-                        </a:rPr>
-                        <a:t>consistently</a:t>
+                        <a:t>Renamed Package to Component consistently</a:t>
                       </a:r>
                     </a:p>
                     <a:p>
@@ -3432,31 +3405,7 @@
                         <a:rPr lang="de-DE" sz="1200" b="0" i="0" dirty="0" smtClean="0">
                           <a:latin typeface="+mn-lt"/>
                         </a:rPr>
-                        <a:t>Removed </a:t>
-                      </a:r>
-                      <a:r>
-                        <a:rPr lang="de-DE" sz="1200" b="0" i="0" dirty="0" smtClean="0">
-                          <a:latin typeface="+mn-lt"/>
-                        </a:rPr>
-                        <a:t>COTS Management function (can be part of Component </a:t>
-                      </a:r>
-                      <a:r>
-                        <a:rPr lang="de-DE" sz="1200" b="0" i="0" dirty="0" smtClean="0">
-                          <a:latin typeface="+mn-lt"/>
-                        </a:rPr>
-                        <a:t>Metadata </a:t>
-                      </a:r>
-                      <a:r>
-                        <a:rPr lang="de-DE" sz="1200" b="0" i="0" dirty="0" smtClean="0">
-                          <a:latin typeface="+mn-lt"/>
-                        </a:rPr>
-                        <a:t>Repository</a:t>
-                      </a:r>
-                      <a:r>
-                        <a:rPr lang="de-DE" sz="1200" b="0" i="0" dirty="0" smtClean="0">
-                          <a:latin typeface="+mn-lt"/>
-                        </a:rPr>
-                        <a:t>)</a:t>
+                        <a:t>Removed COTS Management function (can be part of Component Metadata Repository)</a:t>
                       </a:r>
                     </a:p>
                     <a:p>
@@ -3808,13 +3757,10 @@
               <a:defRPr sz="1300"/>
             </a:pPr>
             <a:r>
-              <a:rPr lang="en-GB" sz="1300" dirty="0"/>
-              <a:t>Case Data </a:t>
-            </a:r>
-            <a:r>
               <a:rPr lang="en-GB" sz="1300" dirty="0" smtClean="0"/>
-              <a:t>Repository</a:t>
-            </a:r>
+              <a:t>Business Context Repository</a:t>
+            </a:r>
+            <a:endParaRPr lang="en-GB" sz="1300" dirty="0" smtClean="0"/>
           </a:p>
           <a:p>
             <a:pPr algn="ctr">
@@ -4462,11 +4408,7 @@
             </a:r>
             <a:r>
               <a:rPr lang="en-GB" sz="1300" dirty="0" smtClean="0"/>
-              <a:t>Solver </a:t>
-            </a:r>
-            <a:r>
-              <a:rPr lang="en-GB" sz="1100" dirty="0" smtClean="0"/>
-              <a:t>(determine obligations)</a:t>
+              <a:t>Obligations Resolver</a:t>
             </a:r>
             <a:endParaRPr lang="en-GB" sz="1100" dirty="0"/>
           </a:p>
@@ -5368,7 +5310,7 @@
           </a:prstGeom>
           <a:extLst>
             <a:ext uri="{C572A759-6A51-4108-AA02-DFA0A04FC94B}">
-              <ma14:wrappingTextBoxFlag xmlns:ma14="http://schemas.microsoft.com/office/mac/drawingml/2011/main" xmlns:a14="http://schemas.microsoft.com/office/drawing/2010/main" xmlns:m="http://schemas.openxmlformats.org/officeDocument/2006/math" xmlns="" val="1"/>
+              <ma14:wrappingTextBoxFlag xmlns="" xmlns:m="http://schemas.openxmlformats.org/officeDocument/2006/math" xmlns:a14="http://schemas.microsoft.com/office/drawing/2010/main" xmlns:ma14="http://schemas.microsoft.com/office/mac/drawingml/2011/main" val="1"/>
             </a:ext>
           </a:extLst>
         </p:spPr>
@@ -5432,7 +5374,7 @@
           </a:ln>
           <a:extLst>
             <a:ext uri="{C572A759-6A51-4108-AA02-DFA0A04FC94B}">
-              <ma14:wrappingTextBoxFlag xmlns:ma14="http://schemas.microsoft.com/office/mac/drawingml/2011/main" xmlns:a14="http://schemas.microsoft.com/office/drawing/2010/main" xmlns:m="http://schemas.openxmlformats.org/officeDocument/2006/math" xmlns="" val="1"/>
+              <ma14:wrappingTextBoxFlag xmlns="" xmlns:m="http://schemas.openxmlformats.org/officeDocument/2006/math" xmlns:a14="http://schemas.microsoft.com/office/drawing/2010/main" xmlns:ma14="http://schemas.microsoft.com/office/mac/drawingml/2011/main" val="1"/>
             </a:ext>
           </a:extLst>
         </p:spPr>
@@ -5472,7 +5414,7 @@
           </a:ln>
           <a:extLst>
             <a:ext uri="{C572A759-6A51-4108-AA02-DFA0A04FC94B}">
-              <ma14:wrappingTextBoxFlag xmlns:ma14="http://schemas.microsoft.com/office/mac/drawingml/2011/main" xmlns:a14="http://schemas.microsoft.com/office/drawing/2010/main" xmlns:m="http://schemas.openxmlformats.org/officeDocument/2006/math" xmlns="" val="1"/>
+              <ma14:wrappingTextBoxFlag xmlns="" xmlns:m="http://schemas.openxmlformats.org/officeDocument/2006/math" xmlns:a14="http://schemas.microsoft.com/office/drawing/2010/main" xmlns:ma14="http://schemas.microsoft.com/office/mac/drawingml/2011/main" val="1"/>
             </a:ext>
           </a:extLst>
         </p:spPr>
@@ -5837,7 +5779,7 @@
           </a:ln>
           <a:extLst>
             <a:ext uri="{C572A759-6A51-4108-AA02-DFA0A04FC94B}">
-              <ma14:wrappingTextBoxFlag xmlns:ma14="http://schemas.microsoft.com/office/mac/drawingml/2011/main" xmlns:a14="http://schemas.microsoft.com/office/drawing/2010/main" xmlns:m="http://schemas.openxmlformats.org/officeDocument/2006/math" xmlns="" val="1"/>
+              <ma14:wrappingTextBoxFlag xmlns="" xmlns:m="http://schemas.openxmlformats.org/officeDocument/2006/math" xmlns:a14="http://schemas.microsoft.com/office/drawing/2010/main" xmlns:ma14="http://schemas.microsoft.com/office/mac/drawingml/2011/main" val="1"/>
             </a:ext>
           </a:extLst>
         </p:spPr>

</xml_diff>